<commit_message>
eligit added and other technical papers
</commit_message>
<xml_diff>
--- a/Documents/Rescue.pptx
+++ b/Documents/Rescue.pptx
@@ -5,14 +5,14 @@
     <p:sldMasterId id="2147483648" r:id="rId1"/>
   </p:sldMasterIdLst>
   <p:notesMasterIdLst>
-    <p:notesMasterId r:id="rId7"/>
+    <p:notesMasterId r:id="rId8"/>
   </p:notesMasterIdLst>
   <p:sldIdLst>
-    <p:sldId id="263" r:id="rId2"/>
-    <p:sldId id="265" r:id="rId3"/>
-    <p:sldId id="269" r:id="rId4"/>
-    <p:sldId id="261" r:id="rId5"/>
-    <p:sldId id="262" r:id="rId6"/>
+    <p:sldId id="263" r:id="rId3"/>
+    <p:sldId id="265" r:id="rId4"/>
+    <p:sldId id="269" r:id="rId5"/>
+    <p:sldId id="261" r:id="rId6"/>
+    <p:sldId id="262" r:id="rId7"/>
   </p:sldIdLst>
   <p:sldSz cx="12192000" cy="6858000"/>
   <p:notesSz cx="6858000" cy="9144000"/>
@@ -111,22 +111,6 @@
       </a:defRPr>
     </a:lvl9pPr>
   </p:defaultTextStyle>
-  <p:extLst>
-    <p:ext uri="{EFAFB233-063F-42B5-8137-9DF3F51BA10A}">
-      <p15:sldGuideLst xmlns:p15="http://schemas.microsoft.com/office/powerpoint/2012/main">
-        <p15:guide id="1" orient="horz" pos="2110">
-          <p15:clr>
-            <a:srgbClr val="A4A3A4"/>
-          </p15:clr>
-        </p15:guide>
-        <p15:guide id="2" pos="3866">
-          <p15:clr>
-            <a:srgbClr val="A4A3A4"/>
-          </p15:clr>
-        </p15:guide>
-      </p15:sldGuideLst>
-    </p:ext>
-  </p:extLst>
 </p:presentation>
 </file>
 
@@ -212,7 +196,6 @@
           <a:p>
             <a:fld id="{DE1739FA-8D86-49DA-B621-117EB9B3EC05}" type="datetimeFigureOut">
               <a:rPr lang="en-US" smtClean="0"/>
-              <a:t>2/26/2020</a:t>
             </a:fld>
             <a:endParaRPr lang="en-US"/>
           </a:p>
@@ -279,6 +262,7 @@
               <a:rPr lang="en-US"/>
               <a:t>Click to edit Master text styles</a:t>
             </a:r>
+            <a:endParaRPr lang="en-US"/>
           </a:p>
           <a:p>
             <a:pPr lvl="1"/>
@@ -286,6 +270,7 @@
               <a:rPr lang="en-US"/>
               <a:t>Second level</a:t>
             </a:r>
+            <a:endParaRPr lang="en-US"/>
           </a:p>
           <a:p>
             <a:pPr lvl="2"/>
@@ -293,6 +278,7 @@
               <a:rPr lang="en-US"/>
               <a:t>Third level</a:t>
             </a:r>
+            <a:endParaRPr lang="en-US"/>
           </a:p>
           <a:p>
             <a:pPr lvl="3"/>
@@ -300,6 +286,7 @@
               <a:rPr lang="en-US"/>
               <a:t>Fourth level</a:t>
             </a:r>
+            <a:endParaRPr lang="en-US"/>
           </a:p>
           <a:p>
             <a:pPr lvl="4"/>
@@ -307,6 +294,7 @@
               <a:rPr lang="en-US"/>
               <a:t>Fifth level</a:t>
             </a:r>
+            <a:endParaRPr lang="en-US"/>
           </a:p>
         </p:txBody>
       </p:sp>
@@ -370,7 +358,6 @@
           <a:p>
             <a:fld id="{9FD5D7AB-7D0F-4744-B848-131B76D0DB31}" type="slidenum">
               <a:rPr lang="en-US" smtClean="0"/>
-              <a:t>‹#›</a:t>
             </a:fld>
             <a:endParaRPr lang="en-US"/>
           </a:p>
@@ -605,7 +592,6 @@
           <a:p>
             <a:fld id="{DEBB1A40-CEB4-404B-BDEC-031982722AD1}" type="datetimeFigureOut">
               <a:rPr lang="en-IN" smtClean="0"/>
-              <a:t>26-02-2020</a:t>
             </a:fld>
             <a:endParaRPr lang="en-IN"/>
           </a:p>
@@ -647,7 +633,6 @@
           <a:p>
             <a:fld id="{78B49F29-8AC5-4E67-9491-285136E831C7}" type="slidenum">
               <a:rPr lang="en-IN" smtClean="0"/>
-              <a:t>‹#›</a:t>
             </a:fld>
             <a:endParaRPr lang="en-IN"/>
           </a:p>
@@ -721,6 +706,7 @@
               <a:rPr lang="en-US"/>
               <a:t>Click to edit Master text styles</a:t>
             </a:r>
+            <a:endParaRPr lang="en-US"/>
           </a:p>
           <a:p>
             <a:pPr lvl="1"/>
@@ -728,6 +714,7 @@
               <a:rPr lang="en-US"/>
               <a:t>Second level</a:t>
             </a:r>
+            <a:endParaRPr lang="en-US"/>
           </a:p>
           <a:p>
             <a:pPr lvl="2"/>
@@ -735,6 +722,7 @@
               <a:rPr lang="en-US"/>
               <a:t>Third level</a:t>
             </a:r>
+            <a:endParaRPr lang="en-US"/>
           </a:p>
           <a:p>
             <a:pPr lvl="3"/>
@@ -742,6 +730,7 @@
               <a:rPr lang="en-US"/>
               <a:t>Fourth level</a:t>
             </a:r>
+            <a:endParaRPr lang="en-US"/>
           </a:p>
           <a:p>
             <a:pPr lvl="4"/>
@@ -770,7 +759,6 @@
           <a:p>
             <a:fld id="{DEBB1A40-CEB4-404B-BDEC-031982722AD1}" type="datetimeFigureOut">
               <a:rPr lang="en-IN" smtClean="0"/>
-              <a:t>26-02-2020</a:t>
             </a:fld>
             <a:endParaRPr lang="en-IN"/>
           </a:p>
@@ -812,7 +800,6 @@
           <a:p>
             <a:fld id="{78B49F29-8AC5-4E67-9491-285136E831C7}" type="slidenum">
               <a:rPr lang="en-IN" smtClean="0"/>
-              <a:t>‹#›</a:t>
             </a:fld>
             <a:endParaRPr lang="en-IN"/>
           </a:p>
@@ -896,6 +883,7 @@
               <a:rPr lang="en-US"/>
               <a:t>Click to edit Master text styles</a:t>
             </a:r>
+            <a:endParaRPr lang="en-US"/>
           </a:p>
           <a:p>
             <a:pPr lvl="1"/>
@@ -903,6 +891,7 @@
               <a:rPr lang="en-US"/>
               <a:t>Second level</a:t>
             </a:r>
+            <a:endParaRPr lang="en-US"/>
           </a:p>
           <a:p>
             <a:pPr lvl="2"/>
@@ -910,6 +899,7 @@
               <a:rPr lang="en-US"/>
               <a:t>Third level</a:t>
             </a:r>
+            <a:endParaRPr lang="en-US"/>
           </a:p>
           <a:p>
             <a:pPr lvl="3"/>
@@ -917,6 +907,7 @@
               <a:rPr lang="en-US"/>
               <a:t>Fourth level</a:t>
             </a:r>
+            <a:endParaRPr lang="en-US"/>
           </a:p>
           <a:p>
             <a:pPr lvl="4"/>
@@ -945,7 +936,6 @@
           <a:p>
             <a:fld id="{DEBB1A40-CEB4-404B-BDEC-031982722AD1}" type="datetimeFigureOut">
               <a:rPr lang="en-IN" smtClean="0"/>
-              <a:t>26-02-2020</a:t>
             </a:fld>
             <a:endParaRPr lang="en-IN"/>
           </a:p>
@@ -987,7 +977,6 @@
           <a:p>
             <a:fld id="{78B49F29-8AC5-4E67-9491-285136E831C7}" type="slidenum">
               <a:rPr lang="en-IN" smtClean="0"/>
-              <a:t>‹#›</a:t>
             </a:fld>
             <a:endParaRPr lang="en-IN"/>
           </a:p>
@@ -1061,6 +1050,7 @@
               <a:rPr lang="en-US"/>
               <a:t>Click to edit Master text styles</a:t>
             </a:r>
+            <a:endParaRPr lang="en-US"/>
           </a:p>
           <a:p>
             <a:pPr lvl="1"/>
@@ -1068,6 +1058,7 @@
               <a:rPr lang="en-US"/>
               <a:t>Second level</a:t>
             </a:r>
+            <a:endParaRPr lang="en-US"/>
           </a:p>
           <a:p>
             <a:pPr lvl="2"/>
@@ -1075,6 +1066,7 @@
               <a:rPr lang="en-US"/>
               <a:t>Third level</a:t>
             </a:r>
+            <a:endParaRPr lang="en-US"/>
           </a:p>
           <a:p>
             <a:pPr lvl="3"/>
@@ -1082,6 +1074,7 @@
               <a:rPr lang="en-US"/>
               <a:t>Fourth level</a:t>
             </a:r>
+            <a:endParaRPr lang="en-US"/>
           </a:p>
           <a:p>
             <a:pPr lvl="4"/>
@@ -1110,7 +1103,6 @@
           <a:p>
             <a:fld id="{DEBB1A40-CEB4-404B-BDEC-031982722AD1}" type="datetimeFigureOut">
               <a:rPr lang="en-IN" smtClean="0"/>
-              <a:t>26-02-2020</a:t>
             </a:fld>
             <a:endParaRPr lang="en-IN"/>
           </a:p>
@@ -1152,7 +1144,6 @@
           <a:p>
             <a:fld id="{78B49F29-8AC5-4E67-9491-285136E831C7}" type="slidenum">
               <a:rPr lang="en-IN" smtClean="0"/>
-              <a:t>‹#›</a:t>
             </a:fld>
             <a:endParaRPr lang="en-IN"/>
           </a:p>
@@ -1331,6 +1322,7 @@
               <a:rPr lang="en-US"/>
               <a:t>Click to edit Master text styles</a:t>
             </a:r>
+            <a:endParaRPr lang="en-US"/>
           </a:p>
         </p:txBody>
       </p:sp>
@@ -1351,7 +1343,6 @@
           <a:p>
             <a:fld id="{DEBB1A40-CEB4-404B-BDEC-031982722AD1}" type="datetimeFigureOut">
               <a:rPr lang="en-IN" smtClean="0"/>
-              <a:t>26-02-2020</a:t>
             </a:fld>
             <a:endParaRPr lang="en-IN"/>
           </a:p>
@@ -1393,7 +1384,6 @@
           <a:p>
             <a:fld id="{78B49F29-8AC5-4E67-9491-285136E831C7}" type="slidenum">
               <a:rPr lang="en-IN" smtClean="0"/>
-              <a:t>‹#›</a:t>
             </a:fld>
             <a:endParaRPr lang="en-IN"/>
           </a:p>
@@ -1472,6 +1462,7 @@
               <a:rPr lang="en-US"/>
               <a:t>Click to edit Master text styles</a:t>
             </a:r>
+            <a:endParaRPr lang="en-US"/>
           </a:p>
           <a:p>
             <a:pPr lvl="1"/>
@@ -1479,6 +1470,7 @@
               <a:rPr lang="en-US"/>
               <a:t>Second level</a:t>
             </a:r>
+            <a:endParaRPr lang="en-US"/>
           </a:p>
           <a:p>
             <a:pPr lvl="2"/>
@@ -1486,6 +1478,7 @@
               <a:rPr lang="en-US"/>
               <a:t>Third level</a:t>
             </a:r>
+            <a:endParaRPr lang="en-US"/>
           </a:p>
           <a:p>
             <a:pPr lvl="3"/>
@@ -1493,6 +1486,7 @@
               <a:rPr lang="en-US"/>
               <a:t>Fourth level</a:t>
             </a:r>
+            <a:endParaRPr lang="en-US"/>
           </a:p>
           <a:p>
             <a:pPr lvl="4"/>
@@ -1529,6 +1523,7 @@
               <a:rPr lang="en-US"/>
               <a:t>Click to edit Master text styles</a:t>
             </a:r>
+            <a:endParaRPr lang="en-US"/>
           </a:p>
           <a:p>
             <a:pPr lvl="1"/>
@@ -1536,6 +1531,7 @@
               <a:rPr lang="en-US"/>
               <a:t>Second level</a:t>
             </a:r>
+            <a:endParaRPr lang="en-US"/>
           </a:p>
           <a:p>
             <a:pPr lvl="2"/>
@@ -1543,6 +1539,7 @@
               <a:rPr lang="en-US"/>
               <a:t>Third level</a:t>
             </a:r>
+            <a:endParaRPr lang="en-US"/>
           </a:p>
           <a:p>
             <a:pPr lvl="3"/>
@@ -1550,6 +1547,7 @@
               <a:rPr lang="en-US"/>
               <a:t>Fourth level</a:t>
             </a:r>
+            <a:endParaRPr lang="en-US"/>
           </a:p>
           <a:p>
             <a:pPr lvl="4"/>
@@ -1578,7 +1576,6 @@
           <a:p>
             <a:fld id="{DEBB1A40-CEB4-404B-BDEC-031982722AD1}" type="datetimeFigureOut">
               <a:rPr lang="en-IN" smtClean="0"/>
-              <a:t>26-02-2020</a:t>
             </a:fld>
             <a:endParaRPr lang="en-IN"/>
           </a:p>
@@ -1620,7 +1617,6 @@
           <a:p>
             <a:fld id="{78B49F29-8AC5-4E67-9491-285136E831C7}" type="slidenum">
               <a:rPr lang="en-IN" smtClean="0"/>
-              <a:t>‹#›</a:t>
             </a:fld>
             <a:endParaRPr lang="en-IN"/>
           </a:p>
@@ -1741,6 +1737,7 @@
               <a:rPr lang="en-US"/>
               <a:t>Click to edit Master text styles</a:t>
             </a:r>
+            <a:endParaRPr lang="en-US"/>
           </a:p>
         </p:txBody>
       </p:sp>
@@ -1769,6 +1766,7 @@
               <a:rPr lang="en-US"/>
               <a:t>Click to edit Master text styles</a:t>
             </a:r>
+            <a:endParaRPr lang="en-US"/>
           </a:p>
           <a:p>
             <a:pPr lvl="1"/>
@@ -1776,6 +1774,7 @@
               <a:rPr lang="en-US"/>
               <a:t>Second level</a:t>
             </a:r>
+            <a:endParaRPr lang="en-US"/>
           </a:p>
           <a:p>
             <a:pPr lvl="2"/>
@@ -1783,6 +1782,7 @@
               <a:rPr lang="en-US"/>
               <a:t>Third level</a:t>
             </a:r>
+            <a:endParaRPr lang="en-US"/>
           </a:p>
           <a:p>
             <a:pPr lvl="3"/>
@@ -1790,6 +1790,7 @@
               <a:rPr lang="en-US"/>
               <a:t>Fourth level</a:t>
             </a:r>
+            <a:endParaRPr lang="en-US"/>
           </a:p>
           <a:p>
             <a:pPr lvl="4"/>
@@ -1863,6 +1864,7 @@
               <a:rPr lang="en-US"/>
               <a:t>Click to edit Master text styles</a:t>
             </a:r>
+            <a:endParaRPr lang="en-US"/>
           </a:p>
         </p:txBody>
       </p:sp>
@@ -1891,6 +1893,7 @@
               <a:rPr lang="en-US"/>
               <a:t>Click to edit Master text styles</a:t>
             </a:r>
+            <a:endParaRPr lang="en-US"/>
           </a:p>
           <a:p>
             <a:pPr lvl="1"/>
@@ -1898,6 +1901,7 @@
               <a:rPr lang="en-US"/>
               <a:t>Second level</a:t>
             </a:r>
+            <a:endParaRPr lang="en-US"/>
           </a:p>
           <a:p>
             <a:pPr lvl="2"/>
@@ -1905,6 +1909,7 @@
               <a:rPr lang="en-US"/>
               <a:t>Third level</a:t>
             </a:r>
+            <a:endParaRPr lang="en-US"/>
           </a:p>
           <a:p>
             <a:pPr lvl="3"/>
@@ -1912,6 +1917,7 @@
               <a:rPr lang="en-US"/>
               <a:t>Fourth level</a:t>
             </a:r>
+            <a:endParaRPr lang="en-US"/>
           </a:p>
           <a:p>
             <a:pPr lvl="4"/>
@@ -1940,7 +1946,6 @@
           <a:p>
             <a:fld id="{DEBB1A40-CEB4-404B-BDEC-031982722AD1}" type="datetimeFigureOut">
               <a:rPr lang="en-IN" smtClean="0"/>
-              <a:t>26-02-2020</a:t>
             </a:fld>
             <a:endParaRPr lang="en-IN"/>
           </a:p>
@@ -1982,7 +1987,6 @@
           <a:p>
             <a:fld id="{78B49F29-8AC5-4E67-9491-285136E831C7}" type="slidenum">
               <a:rPr lang="en-IN" smtClean="0"/>
-              <a:t>‹#›</a:t>
             </a:fld>
             <a:endParaRPr lang="en-IN"/>
           </a:p>
@@ -2053,7 +2057,6 @@
           <a:p>
             <a:fld id="{DEBB1A40-CEB4-404B-BDEC-031982722AD1}" type="datetimeFigureOut">
               <a:rPr lang="en-IN" smtClean="0"/>
-              <a:t>26-02-2020</a:t>
             </a:fld>
             <a:endParaRPr lang="en-IN"/>
           </a:p>
@@ -2095,7 +2098,6 @@
           <a:p>
             <a:fld id="{78B49F29-8AC5-4E67-9491-285136E831C7}" type="slidenum">
               <a:rPr lang="en-IN" smtClean="0"/>
-              <a:t>‹#›</a:t>
             </a:fld>
             <a:endParaRPr lang="en-IN"/>
           </a:p>
@@ -2143,7 +2145,6 @@
           <a:p>
             <a:fld id="{DEBB1A40-CEB4-404B-BDEC-031982722AD1}" type="datetimeFigureOut">
               <a:rPr lang="en-IN" smtClean="0"/>
-              <a:t>26-02-2020</a:t>
             </a:fld>
             <a:endParaRPr lang="en-IN"/>
           </a:p>
@@ -2185,7 +2186,6 @@
           <a:p>
             <a:fld id="{78B49F29-8AC5-4E67-9491-285136E831C7}" type="slidenum">
               <a:rPr lang="en-IN" smtClean="0"/>
-              <a:t>‹#›</a:t>
             </a:fld>
             <a:endParaRPr lang="en-IN"/>
           </a:p>
@@ -2301,6 +2301,7 @@
               <a:rPr lang="en-US"/>
               <a:t>Click to edit Master text styles</a:t>
             </a:r>
+            <a:endParaRPr lang="en-US"/>
           </a:p>
           <a:p>
             <a:pPr lvl="1"/>
@@ -2308,6 +2309,7 @@
               <a:rPr lang="en-US"/>
               <a:t>Second level</a:t>
             </a:r>
+            <a:endParaRPr lang="en-US"/>
           </a:p>
           <a:p>
             <a:pPr lvl="2"/>
@@ -2315,6 +2317,7 @@
               <a:rPr lang="en-US"/>
               <a:t>Third level</a:t>
             </a:r>
+            <a:endParaRPr lang="en-US"/>
           </a:p>
           <a:p>
             <a:pPr lvl="3"/>
@@ -2322,6 +2325,7 @@
               <a:rPr lang="en-US"/>
               <a:t>Fourth level</a:t>
             </a:r>
+            <a:endParaRPr lang="en-US"/>
           </a:p>
           <a:p>
             <a:pPr lvl="4"/>
@@ -2395,6 +2399,7 @@
               <a:rPr lang="en-US"/>
               <a:t>Click to edit Master text styles</a:t>
             </a:r>
+            <a:endParaRPr lang="en-US"/>
           </a:p>
         </p:txBody>
       </p:sp>
@@ -2415,7 +2420,6 @@
           <a:p>
             <a:fld id="{DEBB1A40-CEB4-404B-BDEC-031982722AD1}" type="datetimeFigureOut">
               <a:rPr lang="en-IN" smtClean="0"/>
-              <a:t>26-02-2020</a:t>
             </a:fld>
             <a:endParaRPr lang="en-IN"/>
           </a:p>
@@ -2457,7 +2461,6 @@
           <a:p>
             <a:fld id="{78B49F29-8AC5-4E67-9491-285136E831C7}" type="slidenum">
               <a:rPr lang="en-IN" smtClean="0"/>
-              <a:t>‹#›</a:t>
             </a:fld>
             <a:endParaRPr lang="en-IN"/>
           </a:p>
@@ -2643,6 +2646,7 @@
               <a:rPr lang="en-US"/>
               <a:t>Click to edit Master text styles</a:t>
             </a:r>
+            <a:endParaRPr lang="en-US"/>
           </a:p>
         </p:txBody>
       </p:sp>
@@ -2663,7 +2667,6 @@
           <a:p>
             <a:fld id="{DEBB1A40-CEB4-404B-BDEC-031982722AD1}" type="datetimeFigureOut">
               <a:rPr lang="en-IN" smtClean="0"/>
-              <a:t>26-02-2020</a:t>
             </a:fld>
             <a:endParaRPr lang="en-IN"/>
           </a:p>
@@ -2705,7 +2708,6 @@
           <a:p>
             <a:fld id="{78B49F29-8AC5-4E67-9491-285136E831C7}" type="slidenum">
               <a:rPr lang="en-IN" smtClean="0"/>
-              <a:t>‹#›</a:t>
             </a:fld>
             <a:endParaRPr lang="en-IN"/>
           </a:p>
@@ -2804,6 +2806,7 @@
               <a:rPr lang="en-US"/>
               <a:t>Click to edit Master text styles</a:t>
             </a:r>
+            <a:endParaRPr lang="en-US"/>
           </a:p>
           <a:p>
             <a:pPr lvl="1"/>
@@ -2811,6 +2814,7 @@
               <a:rPr lang="en-US"/>
               <a:t>Second level</a:t>
             </a:r>
+            <a:endParaRPr lang="en-US"/>
           </a:p>
           <a:p>
             <a:pPr lvl="2"/>
@@ -2818,6 +2822,7 @@
               <a:rPr lang="en-US"/>
               <a:t>Third level</a:t>
             </a:r>
+            <a:endParaRPr lang="en-US"/>
           </a:p>
           <a:p>
             <a:pPr lvl="3"/>
@@ -2825,6 +2830,7 @@
               <a:rPr lang="en-US"/>
               <a:t>Fourth level</a:t>
             </a:r>
+            <a:endParaRPr lang="en-US"/>
           </a:p>
           <a:p>
             <a:pPr lvl="4"/>
@@ -2871,7 +2877,6 @@
           <a:p>
             <a:fld id="{DEBB1A40-CEB4-404B-BDEC-031982722AD1}" type="datetimeFigureOut">
               <a:rPr lang="en-IN" smtClean="0"/>
-              <a:t>26-02-2020</a:t>
             </a:fld>
             <a:endParaRPr lang="en-IN"/>
           </a:p>
@@ -2949,7 +2954,6 @@
           <a:p>
             <a:fld id="{78B49F29-8AC5-4E67-9491-285136E831C7}" type="slidenum">
               <a:rPr lang="en-IN" smtClean="0"/>
-              <a:t>‹#›</a:t>
             </a:fld>
             <a:endParaRPr lang="en-IN"/>
           </a:p>
@@ -3431,6 +3435,9 @@
               </a:rPr>
               <a:t>.                </a:t>
             </a:r>
+            <a:endParaRPr lang="en-IN" sz="2000" dirty="0">
+              <a:sym typeface="+mn-ea"/>
+            </a:endParaRPr>
           </a:p>
           <a:p>
             <a:pPr>
@@ -3444,6 +3451,7 @@
               <a:rPr lang="en-US" sz="2000" dirty="0"/>
               <a:t>Nowadays the road accidents in modern urban areas are increased to uncertain level. The loss of human life due to accident is to be avoided.</a:t>
             </a:r>
+            <a:endParaRPr lang="en-US" sz="2000" dirty="0"/>
           </a:p>
           <a:p>
             <a:pPr>
@@ -3457,6 +3465,7 @@
               <a:rPr lang="en-US" sz="2000" dirty="0"/>
               <a:t> Traffic congestion is a major fact that causes delay to ambulance. The idea behind this is to implement a system which would control mechanically the traffic lights in the path of the ambulance.</a:t>
             </a:r>
+            <a:endParaRPr lang="en-US" sz="2000" dirty="0"/>
           </a:p>
           <a:p>
             <a:pPr>
@@ -3476,6 +3485,9 @@
               </a:rPr>
               <a:t> </a:t>
             </a:r>
+            <a:endParaRPr lang="en-IN" sz="2000" dirty="0">
+              <a:sym typeface="+mn-ea"/>
+            </a:endParaRPr>
           </a:p>
           <a:p>
             <a:pPr marL="0" indent="0" algn="l">
@@ -3524,6 +3536,9 @@
               </a:rPr>
               <a:t> Abhishek Gupta </a:t>
             </a:r>
+            <a:endParaRPr lang="en-IN" sz="2000" dirty="0">
+              <a:sym typeface="+mn-ea"/>
+            </a:endParaRPr>
           </a:p>
           <a:p>
             <a:pPr marL="0" indent="0" algn="l">
@@ -3566,6 +3581,9 @@
               </a:rPr>
               <a:t> : C17 	     </a:t>
             </a:r>
+            <a:endParaRPr lang="en-IN" sz="2000" dirty="0">
+              <a:sym typeface="+mn-ea"/>
+            </a:endParaRPr>
           </a:p>
           <a:p>
             <a:pPr marL="0" indent="0" algn="l">
@@ -3614,6 +3632,9 @@
               </a:rPr>
               <a:t> Impulse.</a:t>
             </a:r>
+            <a:endParaRPr lang="en-IN" sz="2000" dirty="0">
+              <a:sym typeface="+mn-ea"/>
+            </a:endParaRPr>
           </a:p>
           <a:p>
             <a:pPr marL="0" indent="0" algn="l">
@@ -3659,20 +3680,14 @@
       </p:sp>
       <p:pic>
         <p:nvPicPr>
-          <p:cNvPr id="3" name="Picture 2">
-            <a:extLst>
-              <a:ext uri="{FF2B5EF4-FFF2-40B4-BE49-F238E27FC236}">
-                <a16:creationId xmlns:a16="http://schemas.microsoft.com/office/drawing/2014/main" id="{69FF533D-4E14-4B0E-B9B7-69D80039C35B}"/>
-              </a:ext>
-            </a:extLst>
-          </p:cNvPr>
+          <p:cNvPr id="3" name="Picture 2"/>
           <p:cNvPicPr>
             <a:picLocks noChangeAspect="1"/>
           </p:cNvPicPr>
           <p:nvPr/>
         </p:nvPicPr>
         <p:blipFill>
-          <a:blip r:embed="rId2">
+          <a:blip r:embed="rId1">
             <a:extLst>
               <a:ext uri="{28A0092B-C50C-407E-A947-70E740481C1C}">
                 <a14:useLocalDpi xmlns:a14="http://schemas.microsoft.com/office/drawing/2010/main" val="0"/>
@@ -3695,13 +3710,7 @@
       </p:pic>
       <p:sp>
         <p:nvSpPr>
-          <p:cNvPr id="6" name="Rectangle 5">
-            <a:extLst>
-              <a:ext uri="{FF2B5EF4-FFF2-40B4-BE49-F238E27FC236}">
-                <a16:creationId xmlns:a16="http://schemas.microsoft.com/office/drawing/2014/main" id="{5FEA7B0F-0B31-4E44-81F1-3CC085A0FDED}"/>
-              </a:ext>
-            </a:extLst>
-          </p:cNvPr>
+          <p:cNvPr id="6" name="Rectangle 5"/>
           <p:cNvSpPr/>
           <p:nvPr/>
         </p:nvSpPr>
@@ -3854,6 +3863,30 @@
               </a:rPr>
               <a:t> :- </a:t>
             </a:r>
+            <a:endParaRPr lang="en-IN" altLang="en-US" sz="2100" b="1" i="1" dirty="0">
+              <a:gradFill>
+                <a:gsLst>
+                  <a:gs pos="0">
+                    <a:schemeClr val="accent5">
+                      <a:lumMod val="50000"/>
+                    </a:schemeClr>
+                  </a:gs>
+                  <a:gs pos="50000">
+                    <a:schemeClr val="accent5"/>
+                  </a:gs>
+                  <a:gs pos="100000">
+                    <a:schemeClr val="accent5">
+                      <a:lumMod val="60000"/>
+                      <a:lumOff val="40000"/>
+                    </a:schemeClr>
+                  </a:gs>
+                </a:gsLst>
+                <a:lin ang="5400000"/>
+              </a:gradFill>
+              <a:effectLst>
+                <a:reflection blurRad="6350" stA="53000" endA="300" endPos="35500" dir="5400000" sy="-90000" algn="bl" rotWithShape="0"/>
+              </a:effectLst>
+            </a:endParaRPr>
           </a:p>
           <a:p>
             <a:pPr algn="l"/>
@@ -3921,6 +3954,18 @@
               </a:rPr>
               <a:t>Collections</a:t>
             </a:r>
+            <a:endParaRPr lang="en-IN" altLang="en-US" b="1" dirty="0">
+              <a:solidFill>
+                <a:schemeClr val="tx1"/>
+              </a:solidFill>
+              <a:effectLst>
+                <a:outerShdw blurRad="38100" dist="19050" dir="2700000" algn="tl" rotWithShape="0">
+                  <a:schemeClr val="dk1">
+                    <a:alpha val="40000"/>
+                  </a:schemeClr>
+                </a:outerShdw>
+              </a:effectLst>
+            </a:endParaRPr>
           </a:p>
           <a:p>
             <a:pPr algn="ctr"/>
@@ -3935,6 +3980,7 @@
               <a:rPr lang="en-IN" altLang="en-US" dirty="0"/>
               <a:t>At the gate , when IR sensor gets activated the camera module will be triggered and that specific data will be fed into Processing layer .</a:t>
             </a:r>
+            <a:endParaRPr lang="en-IN" altLang="en-US" dirty="0"/>
           </a:p>
           <a:p>
             <a:pPr marL="285750" indent="-285750">
@@ -4008,6 +4054,19 @@
               </a:rPr>
               <a:t>rocessing</a:t>
             </a:r>
+            <a:endParaRPr lang="en-IN" altLang="en-US" b="1" dirty="0">
+              <a:solidFill>
+                <a:schemeClr val="tx1"/>
+              </a:solidFill>
+              <a:effectLst>
+                <a:outerShdw blurRad="38100" dist="19050" dir="2700000" algn="tl" rotWithShape="0">
+                  <a:schemeClr val="dk1">
+                    <a:alpha val="40000"/>
+                  </a:schemeClr>
+                </a:outerShdw>
+              </a:effectLst>
+              <a:sym typeface="+mn-ea"/>
+            </a:endParaRPr>
           </a:p>
           <a:p>
             <a:pPr algn="ctr"/>
@@ -4240,7 +4299,7 @@
           </p:nvPr>
         </p:nvPicPr>
         <p:blipFill>
-          <a:blip r:embed="rId2"/>
+          <a:blip r:embed="rId1"/>
           <a:srcRect l="8985" r="8985"/>
           <a:stretch>
             <a:fillRect/>
@@ -4267,7 +4326,7 @@
           </p:nvPr>
         </p:nvPicPr>
         <p:blipFill>
-          <a:blip r:embed="rId3"/>
+          <a:blip r:embed="rId2"/>
           <a:stretch>
             <a:fillRect/>
           </a:stretch>
@@ -4332,6 +4391,30 @@
               </a:rPr>
               <a:t>Prototye Flow</a:t>
             </a:r>
+            <a:endParaRPr lang="en-IN" altLang="en-US" sz="1900" b="1" i="1" u="sng">
+              <a:gradFill>
+                <a:gsLst>
+                  <a:gs pos="0">
+                    <a:schemeClr val="accent5">
+                      <a:lumMod val="50000"/>
+                    </a:schemeClr>
+                  </a:gs>
+                  <a:gs pos="50000">
+                    <a:schemeClr val="accent5"/>
+                  </a:gs>
+                  <a:gs pos="100000">
+                    <a:schemeClr val="accent5">
+                      <a:lumMod val="60000"/>
+                      <a:lumOff val="40000"/>
+                    </a:schemeClr>
+                  </a:gs>
+                </a:gsLst>
+                <a:lin ang="5400000"/>
+              </a:gradFill>
+              <a:effectLst>
+                <a:reflection blurRad="6350" stA="53000" endA="300" endPos="35500" dir="5400000" sy="-90000" algn="bl" rotWithShape="0"/>
+              </a:effectLst>
+            </a:endParaRPr>
           </a:p>
         </p:txBody>
       </p:sp>
@@ -4385,6 +4468,30 @@
               </a:rPr>
               <a:t>System Flow</a:t>
             </a:r>
+            <a:endParaRPr lang="en-IN" altLang="en-US" sz="1900" b="1" i="1" u="sng">
+              <a:gradFill>
+                <a:gsLst>
+                  <a:gs pos="0">
+                    <a:schemeClr val="accent5">
+                      <a:lumMod val="50000"/>
+                    </a:schemeClr>
+                  </a:gs>
+                  <a:gs pos="50000">
+                    <a:schemeClr val="accent5"/>
+                  </a:gs>
+                  <a:gs pos="100000">
+                    <a:schemeClr val="accent5">
+                      <a:lumMod val="60000"/>
+                      <a:lumOff val="40000"/>
+                    </a:schemeClr>
+                  </a:gs>
+                </a:gsLst>
+                <a:lin ang="5400000"/>
+              </a:gradFill>
+              <a:effectLst>
+                <a:reflection blurRad="6350" stA="53000" endA="300" endPos="35500" dir="5400000" sy="-90000" algn="bl" rotWithShape="0"/>
+              </a:effectLst>
+            </a:endParaRPr>
           </a:p>
         </p:txBody>
       </p:sp>
@@ -4612,6 +4719,7 @@
               <a:rPr lang="en-IN" altLang="en-US" b="1" dirty="0"/>
               <a:t>he parks the slot number is made visible to him on the app.</a:t>
             </a:r>
+            <a:endParaRPr lang="en-IN" altLang="en-US" b="1" dirty="0"/>
           </a:p>
           <a:p>
             <a:pPr marL="285750" indent="-285750">
@@ -4642,6 +4750,7 @@
               <a:rPr lang="en-IN" altLang="en-US"/>
               <a:t>(stealing).</a:t>
             </a:r>
+            <a:endParaRPr lang="en-IN" altLang="en-US"/>
           </a:p>
           <a:p>
             <a:pPr marL="285750" indent="-285750">
@@ -4719,6 +4828,9 @@
               </a:rPr>
               <a:t>.</a:t>
             </a:r>
+            <a:endParaRPr lang="en-US" dirty="0">
+              <a:sym typeface="+mn-ea"/>
+            </a:endParaRPr>
           </a:p>
           <a:p>
             <a:pPr marL="342900" indent="-342900" algn="l">
@@ -4816,6 +4928,9 @@
               </a:rPr>
               <a:t> spot .</a:t>
             </a:r>
+            <a:endParaRPr lang="en-IN" altLang="en-US" dirty="0">
+              <a:sym typeface="+mn-ea"/>
+            </a:endParaRPr>
           </a:p>
           <a:p>
             <a:pPr marL="285750" indent="-285750" algn="l">
@@ -4873,6 +4988,9 @@
               </a:rPr>
               <a:t>money deducted).</a:t>
             </a:r>
+            <a:endParaRPr lang="en-US" dirty="0">
+              <a:sym typeface="+mn-ea"/>
+            </a:endParaRPr>
           </a:p>
           <a:p>
             <a:pPr marL="285750" indent="-285750" algn="l">
@@ -4897,6 +5015,9 @@
               </a:rPr>
               <a:t> (entry and exit time) will be visible to him at all times.</a:t>
             </a:r>
+            <a:endParaRPr lang="en-US" dirty="0">
+              <a:sym typeface="+mn-ea"/>
+            </a:endParaRPr>
           </a:p>
           <a:p>
             <a:pPr marL="285750" indent="-285750" algn="l">
@@ -4939,6 +5060,9 @@
               </a:rPr>
               <a:t>notified immediately.</a:t>
             </a:r>
+            <a:endParaRPr lang="en-US" b="1" dirty="0">
+              <a:sym typeface="+mn-ea"/>
+            </a:endParaRPr>
           </a:p>
         </p:txBody>
       </p:sp>
@@ -4953,7 +5077,7 @@
           </p:nvPr>
         </p:nvPicPr>
         <p:blipFill>
-          <a:blip r:embed="rId2"/>
+          <a:blip r:embed="rId1"/>
           <a:stretch>
             <a:fillRect/>
           </a:stretch>
@@ -4979,7 +5103,7 @@
           </p:nvPr>
         </p:nvPicPr>
         <p:blipFill>
-          <a:blip r:embed="rId3"/>
+          <a:blip r:embed="rId2"/>
           <a:srcRect t="756" b="345"/>
           <a:stretch>
             <a:fillRect/>
@@ -5045,6 +5169,30 @@
               </a:rPr>
               <a:t>Data Processing</a:t>
             </a:r>
+            <a:endParaRPr lang="en-IN" altLang="en-US" sz="2000" b="1" i="1" u="sng">
+              <a:gradFill>
+                <a:gsLst>
+                  <a:gs pos="0">
+                    <a:schemeClr val="accent5">
+                      <a:lumMod val="50000"/>
+                    </a:schemeClr>
+                  </a:gs>
+                  <a:gs pos="50000">
+                    <a:schemeClr val="accent5"/>
+                  </a:gs>
+                  <a:gs pos="100000">
+                    <a:schemeClr val="accent5">
+                      <a:lumMod val="60000"/>
+                      <a:lumOff val="40000"/>
+                    </a:schemeClr>
+                  </a:gs>
+                </a:gsLst>
+                <a:lin ang="5400000"/>
+              </a:gradFill>
+              <a:effectLst>
+                <a:reflection blurRad="6350" stA="53000" endA="300" endPos="35500" dir="5400000" sy="-90000" algn="bl" rotWithShape="0"/>
+              </a:effectLst>
+            </a:endParaRPr>
           </a:p>
         </p:txBody>
       </p:sp>
@@ -5098,6 +5246,30 @@
               </a:rPr>
               <a:t>Data Visualization</a:t>
             </a:r>
+            <a:endParaRPr lang="en-IN" altLang="en-US" sz="2000" b="1" i="1" u="sng">
+              <a:gradFill>
+                <a:gsLst>
+                  <a:gs pos="0">
+                    <a:schemeClr val="accent5">
+                      <a:lumMod val="50000"/>
+                    </a:schemeClr>
+                  </a:gs>
+                  <a:gs pos="50000">
+                    <a:schemeClr val="accent5"/>
+                  </a:gs>
+                  <a:gs pos="100000">
+                    <a:schemeClr val="accent5">
+                      <a:lumMod val="60000"/>
+                      <a:lumOff val="40000"/>
+                    </a:schemeClr>
+                  </a:gs>
+                </a:gsLst>
+                <a:lin ang="5400000"/>
+              </a:gradFill>
+              <a:effectLst>
+                <a:reflection blurRad="6350" stA="53000" endA="300" endPos="35500" dir="5400000" sy="-90000" algn="bl" rotWithShape="0"/>
+              </a:effectLst>
+            </a:endParaRPr>
           </a:p>
         </p:txBody>
       </p:sp>
@@ -5135,7 +5307,7 @@
         <p:spPr>
           <a:xfrm>
             <a:off x="120651" y="183792"/>
-            <a:ext cx="6137564" cy="4970591"/>
+            <a:ext cx="6137564" cy="4892675"/>
           </a:xfrm>
           <a:prstGeom prst="rect">
             <a:avLst/>
@@ -5244,7 +5416,7 @@
                 <a:cs typeface="Calibri" panose="020F0502020204030204" pitchFamily="34" charset="0"/>
                 <a:sym typeface="+mn-ea"/>
               </a:rPr>
-              <a:t>:-  Machine learning, Deep learning, 		            IoT.</a:t>
+              <a:t>:-  Machine learning, Deep learning, 		            IOT.</a:t>
             </a:r>
             <a:endParaRPr lang="en-IN" dirty="0"/>
           </a:p>
@@ -5279,6 +5451,7 @@
               <a:rPr lang="en-IN" dirty="0"/>
               <a:t>:- Android Studio, Android SDK .</a:t>
             </a:r>
+            <a:endParaRPr lang="en-IN" dirty="0"/>
           </a:p>
           <a:p>
             <a:pPr marL="285750" indent="-285750">
@@ -5312,6 +5485,10 @@
               </a:rPr>
               <a:t> :- Firebase.</a:t>
             </a:r>
+            <a:endParaRPr lang="en-IN" dirty="0">
+              <a:latin typeface="Calibri" panose="020F0502020204030204" pitchFamily="34" charset="0"/>
+              <a:cs typeface="Calibri" panose="020F0502020204030204" pitchFamily="34" charset="0"/>
+            </a:endParaRPr>
           </a:p>
           <a:p>
             <a:pPr marL="285750" indent="-285750" algn="just">
@@ -5347,6 +5524,16 @@
               </a:rPr>
               <a:t>:- Arduino, MEMS  and Vibration</a:t>
             </a:r>
+            <a:endParaRPr lang="en-IN" dirty="0">
+              <a:effectLst>
+                <a:outerShdw blurRad="38100" dist="19050" dir="2700000" algn="tl" rotWithShape="0">
+                  <a:schemeClr val="dk1">
+                    <a:alpha val="40000"/>
+                  </a:schemeClr>
+                </a:outerShdw>
+              </a:effectLst>
+              <a:sym typeface="+mn-ea"/>
+            </a:endParaRPr>
           </a:p>
           <a:p>
             <a:pPr>
@@ -5367,6 +5554,16 @@
               </a:rPr>
               <a:t>                                                  Sensors, LCD, Buzzer, GSM and GPS              		                module.</a:t>
             </a:r>
+            <a:endParaRPr lang="en-IN" dirty="0">
+              <a:effectLst>
+                <a:outerShdw blurRad="38100" dist="19050" dir="2700000" algn="tl" rotWithShape="0">
+                  <a:schemeClr val="dk1">
+                    <a:alpha val="40000"/>
+                  </a:schemeClr>
+                </a:outerShdw>
+              </a:effectLst>
+              <a:sym typeface="+mn-ea"/>
+            </a:endParaRPr>
           </a:p>
           <a:p>
             <a:pPr algn="ctr"/>
@@ -5432,6 +5629,9 @@
               </a:rPr>
               <a:t>Android version Jellybean and higher .</a:t>
             </a:r>
+            <a:endParaRPr lang="en-IN" b="1" dirty="0">
+              <a:sym typeface="+mn-ea"/>
+            </a:endParaRPr>
           </a:p>
           <a:p>
             <a:pPr marL="285750" indent="-285750">
@@ -5462,7 +5662,7 @@
           </p:nvPr>
         </p:nvPicPr>
         <p:blipFill>
-          <a:blip r:embed="rId2"/>
+          <a:blip r:embed="rId1"/>
           <a:stretch>
             <a:fillRect/>
           </a:stretch>
@@ -5527,6 +5727,30 @@
               </a:rPr>
               <a:t>Use Case</a:t>
             </a:r>
+            <a:endParaRPr lang="en-IN" altLang="en-US" sz="2500" b="1" i="1" u="sng">
+              <a:gradFill>
+                <a:gsLst>
+                  <a:gs pos="0">
+                    <a:schemeClr val="accent5">
+                      <a:lumMod val="50000"/>
+                    </a:schemeClr>
+                  </a:gs>
+                  <a:gs pos="50000">
+                    <a:schemeClr val="accent5"/>
+                  </a:gs>
+                  <a:gs pos="100000">
+                    <a:schemeClr val="accent5">
+                      <a:lumMod val="60000"/>
+                      <a:lumOff val="40000"/>
+                    </a:schemeClr>
+                  </a:gs>
+                </a:gsLst>
+                <a:lin ang="5400000"/>
+              </a:gradFill>
+              <a:effectLst>
+                <a:reflection blurRad="6350" stA="53000" endA="300" endPos="35500" dir="5400000" sy="-90000" algn="bl" rotWithShape="0"/>
+              </a:effectLst>
+            </a:endParaRPr>
           </a:p>
         </p:txBody>
       </p:sp>
@@ -5602,6 +5826,11 @@
               </a:rPr>
               <a:t>  VEHICLE ACCIDENT DETECTION</a:t>
             </a:r>
+            <a:endParaRPr lang="en-IN" altLang="en-US" b="1" dirty="0">
+              <a:solidFill>
+                <a:schemeClr val="tx1"/>
+              </a:solidFill>
+            </a:endParaRPr>
           </a:p>
           <a:p>
             <a:pPr algn="ctr"/>
@@ -5613,6 +5842,11 @@
               </a:rPr>
               <a:t>The system will automatically detect vehicle accidents on the roads and a ambulance will be allotted for the same. </a:t>
             </a:r>
+            <a:endParaRPr lang="en-IN" altLang="en-US" dirty="0">
+              <a:solidFill>
+                <a:schemeClr val="tx1"/>
+              </a:solidFill>
+            </a:endParaRPr>
           </a:p>
         </p:txBody>
       </p:sp>
@@ -5663,6 +5897,11 @@
               </a:rPr>
               <a:t> </a:t>
             </a:r>
+            <a:endParaRPr lang="en-US" b="1" dirty="0">
+              <a:solidFill>
+                <a:schemeClr val="tx1"/>
+              </a:solidFill>
+            </a:endParaRPr>
           </a:p>
           <a:p>
             <a:pPr algn="ctr"/>
@@ -5674,6 +5913,11 @@
               </a:rPr>
               <a:t>NEAREST HOSPITAL ALLOCATION.</a:t>
             </a:r>
+            <a:endParaRPr lang="en-US" b="1" dirty="0">
+              <a:solidFill>
+                <a:schemeClr val="tx1"/>
+              </a:solidFill>
+            </a:endParaRPr>
           </a:p>
           <a:p>
             <a:pPr algn="ctr"/>
@@ -5685,6 +5929,11 @@
               </a:rPr>
               <a:t>On the basis of location of the patient, the nearest hospital will be alerted and ambulance will be sent to the patient. If the hospital doesn’t have ambulance, the next nearest hospital will be alerted</a:t>
             </a:r>
+            <a:endParaRPr lang="en-US" dirty="0">
+              <a:solidFill>
+                <a:schemeClr val="tx1"/>
+              </a:solidFill>
+            </a:endParaRPr>
           </a:p>
         </p:txBody>
       </p:sp>
@@ -5751,6 +6000,11 @@
               </a:rPr>
               <a:t>TRAFFIC CLEARANCE</a:t>
             </a:r>
+            <a:endParaRPr lang="en-US" b="1" dirty="0">
+              <a:solidFill>
+                <a:schemeClr val="tx1"/>
+              </a:solidFill>
+            </a:endParaRPr>
           </a:p>
           <a:p>
             <a:pPr algn="ctr"/>
@@ -5770,6 +6024,11 @@
               </a:rPr>
               <a:t> </a:t>
             </a:r>
+            <a:endParaRPr lang="en-US" b="1" dirty="0">
+              <a:solidFill>
+                <a:schemeClr val="tx1"/>
+              </a:solidFill>
+            </a:endParaRPr>
           </a:p>
           <a:p>
             <a:pPr algn="ctr"/>
@@ -5836,6 +6095,11 @@
               </a:rPr>
               <a:t>AI CHAT BOT</a:t>
             </a:r>
+            <a:endParaRPr lang="en-IN" altLang="en-US" b="1" dirty="0">
+              <a:solidFill>
+                <a:schemeClr val="tx1"/>
+              </a:solidFill>
+            </a:endParaRPr>
           </a:p>
           <a:p>
             <a:pPr algn="ctr"/>
@@ -5847,6 +6111,11 @@
               </a:rPr>
               <a:t>This bot will commune with the patient or the acquaintance and predict the disease. It will provide precautionary measures too for the predicted disease too.</a:t>
             </a:r>
+            <a:endParaRPr lang="en-IN" altLang="en-US" dirty="0">
+              <a:solidFill>
+                <a:schemeClr val="tx1"/>
+              </a:solidFill>
+            </a:endParaRPr>
           </a:p>
         </p:txBody>
       </p:sp>
@@ -5897,20 +6166,18 @@
               </a:rPr>
               <a:t>SHOWSTOPPERS</a:t>
             </a:r>
+            <a:endParaRPr lang="en-US" sz="2400" b="1" dirty="0">
+              <a:solidFill>
+                <a:schemeClr val="tx1"/>
+              </a:solidFill>
+            </a:endParaRPr>
           </a:p>
         </p:txBody>
       </p:sp>
       <p:cxnSp>
         <p:nvCxnSpPr>
-          <p:cNvPr id="42" name="Straight Arrow Connector 41">
-            <a:extLst>
-              <a:ext uri="{FF2B5EF4-FFF2-40B4-BE49-F238E27FC236}">
-                <a16:creationId xmlns:a16="http://schemas.microsoft.com/office/drawing/2014/main" id="{310A9AD2-8C52-4291-A904-11965F8FD5EB}"/>
-              </a:ext>
-            </a:extLst>
-          </p:cNvPr>
+          <p:cNvPr id="42" name="Straight Arrow Connector 41"/>
           <p:cNvCxnSpPr>
-            <a:cxnSpLocks/>
             <a:stCxn id="15" idx="2"/>
           </p:cNvCxnSpPr>
           <p:nvPr/>
@@ -5944,15 +6211,8 @@
       </p:cxnSp>
       <p:cxnSp>
         <p:nvCxnSpPr>
-          <p:cNvPr id="46" name="Straight Arrow Connector 45">
-            <a:extLst>
-              <a:ext uri="{FF2B5EF4-FFF2-40B4-BE49-F238E27FC236}">
-                <a16:creationId xmlns:a16="http://schemas.microsoft.com/office/drawing/2014/main" id="{1A202ACA-AAC6-4C1C-95FE-971B5238E109}"/>
-              </a:ext>
-            </a:extLst>
-          </p:cNvPr>
+          <p:cNvPr id="46" name="Straight Arrow Connector 45"/>
           <p:cNvCxnSpPr>
-            <a:cxnSpLocks/>
             <a:stCxn id="15" idx="3"/>
           </p:cNvCxnSpPr>
           <p:nvPr/>
@@ -5986,13 +6246,7 @@
       </p:cxnSp>
       <p:cxnSp>
         <p:nvCxnSpPr>
-          <p:cNvPr id="49" name="Straight Arrow Connector 48">
-            <a:extLst>
-              <a:ext uri="{FF2B5EF4-FFF2-40B4-BE49-F238E27FC236}">
-                <a16:creationId xmlns:a16="http://schemas.microsoft.com/office/drawing/2014/main" id="{8434C759-025A-4E66-8C94-191920B59E33}"/>
-              </a:ext>
-            </a:extLst>
-          </p:cNvPr>
+          <p:cNvPr id="49" name="Straight Arrow Connector 48"/>
           <p:cNvCxnSpPr>
             <a:stCxn id="15" idx="5"/>
           </p:cNvCxnSpPr>
@@ -6027,15 +6281,8 @@
       </p:cxnSp>
       <p:cxnSp>
         <p:nvCxnSpPr>
-          <p:cNvPr id="51" name="Straight Arrow Connector 50">
-            <a:extLst>
-              <a:ext uri="{FF2B5EF4-FFF2-40B4-BE49-F238E27FC236}">
-                <a16:creationId xmlns:a16="http://schemas.microsoft.com/office/drawing/2014/main" id="{E2A52E99-4A7A-4671-937F-770E339564C8}"/>
-              </a:ext>
-            </a:extLst>
-          </p:cNvPr>
+          <p:cNvPr id="51" name="Straight Arrow Connector 50"/>
           <p:cNvCxnSpPr>
-            <a:cxnSpLocks/>
             <a:stCxn id="15" idx="6"/>
           </p:cNvCxnSpPr>
           <p:nvPr/>
@@ -6326,8 +6573,6 @@
       </a:bgFillStyleLst>
     </a:fmtScheme>
   </a:themeElements>
-  <a:objectDefaults/>
-  <a:extraClrSchemeLst/>
   <a:extLst>
     <a:ext uri="{05A4C25C-085E-4340-85A3-A5531E510DB2}">
       <thm15:themeFamily xmlns:thm15="http://schemas.microsoft.com/office/thememl/2012/main" name="Office Theme" id="{62F939B6-93AF-4DB8-9C6B-D6C7DFDC589F}" vid="{4A3C46E8-61CC-4603-A589-7422A47A8E4A}"/>
@@ -6616,8 +6861,6 @@
       </a:bgFillStyleLst>
     </a:fmtScheme>
   </a:themeElements>
-  <a:objectDefaults/>
-  <a:extraClrSchemeLst/>
   <a:extLst>
     <a:ext uri="{05A4C25C-085E-4340-85A3-A5531E510DB2}">
       <thm15:themeFamily xmlns:thm15="http://schemas.microsoft.com/office/thememl/2012/main" name="Office Theme" id="{62F939B6-93AF-4DB8-9C6B-D6C7DFDC589F}" vid="{4A3C46E8-61CC-4603-A589-7422A47A8E4A}"/>

</xml_diff>